<commit_message>
add an intermediate state and look at policy
</commit_message>
<xml_diff>
--- a/results and plots/Presentation1.pptx
+++ b/results and plots/Presentation1.pptx
@@ -8,9 +8,14 @@
     <p:sldId id="257" r:id="rId2"/>
     <p:sldId id="258" r:id="rId3"/>
     <p:sldId id="259" r:id="rId4"/>
-    <p:sldId id="260" r:id="rId5"/>
-    <p:sldId id="261" r:id="rId6"/>
-    <p:sldId id="262" r:id="rId7"/>
+    <p:sldId id="266" r:id="rId5"/>
+    <p:sldId id="260" r:id="rId6"/>
+    <p:sldId id="261" r:id="rId7"/>
+    <p:sldId id="262" r:id="rId8"/>
+    <p:sldId id="267" r:id="rId9"/>
+    <p:sldId id="265" r:id="rId10"/>
+    <p:sldId id="263" r:id="rId11"/>
+    <p:sldId id="264" r:id="rId12"/>
   </p:sldIdLst>
   <p:sldSz cx="12192000" cy="6858000"/>
   <p:notesSz cx="6858000" cy="9144000"/>
@@ -266,7 +271,7 @@
           <a:p>
             <a:fld id="{7E7ECEF8-20CD-4468-A5E5-CDF973CB3EBF}" type="datetimeFigureOut">
               <a:rPr lang="en-DE" smtClean="0"/>
-              <a:t>05/06/2023</a:t>
+              <a:t>06/06/2023</a:t>
             </a:fld>
             <a:endParaRPr lang="en-DE"/>
           </a:p>
@@ -466,7 +471,7 @@
           <a:p>
             <a:fld id="{7E7ECEF8-20CD-4468-A5E5-CDF973CB3EBF}" type="datetimeFigureOut">
               <a:rPr lang="en-DE" smtClean="0"/>
-              <a:t>05/06/2023</a:t>
+              <a:t>06/06/2023</a:t>
             </a:fld>
             <a:endParaRPr lang="en-DE"/>
           </a:p>
@@ -676,7 +681,7 @@
           <a:p>
             <a:fld id="{7E7ECEF8-20CD-4468-A5E5-CDF973CB3EBF}" type="datetimeFigureOut">
               <a:rPr lang="en-DE" smtClean="0"/>
-              <a:t>05/06/2023</a:t>
+              <a:t>06/06/2023</a:t>
             </a:fld>
             <a:endParaRPr lang="en-DE"/>
           </a:p>
@@ -876,7 +881,7 @@
           <a:p>
             <a:fld id="{7E7ECEF8-20CD-4468-A5E5-CDF973CB3EBF}" type="datetimeFigureOut">
               <a:rPr lang="en-DE" smtClean="0"/>
-              <a:t>05/06/2023</a:t>
+              <a:t>06/06/2023</a:t>
             </a:fld>
             <a:endParaRPr lang="en-DE"/>
           </a:p>
@@ -1152,7 +1157,7 @@
           <a:p>
             <a:fld id="{7E7ECEF8-20CD-4468-A5E5-CDF973CB3EBF}" type="datetimeFigureOut">
               <a:rPr lang="en-DE" smtClean="0"/>
-              <a:t>05/06/2023</a:t>
+              <a:t>06/06/2023</a:t>
             </a:fld>
             <a:endParaRPr lang="en-DE"/>
           </a:p>
@@ -1420,7 +1425,7 @@
           <a:p>
             <a:fld id="{7E7ECEF8-20CD-4468-A5E5-CDF973CB3EBF}" type="datetimeFigureOut">
               <a:rPr lang="en-DE" smtClean="0"/>
-              <a:t>05/06/2023</a:t>
+              <a:t>06/06/2023</a:t>
             </a:fld>
             <a:endParaRPr lang="en-DE"/>
           </a:p>
@@ -1835,7 +1840,7 @@
           <a:p>
             <a:fld id="{7E7ECEF8-20CD-4468-A5E5-CDF973CB3EBF}" type="datetimeFigureOut">
               <a:rPr lang="en-DE" smtClean="0"/>
-              <a:t>05/06/2023</a:t>
+              <a:t>06/06/2023</a:t>
             </a:fld>
             <a:endParaRPr lang="en-DE"/>
           </a:p>
@@ -1977,7 +1982,7 @@
           <a:p>
             <a:fld id="{7E7ECEF8-20CD-4468-A5E5-CDF973CB3EBF}" type="datetimeFigureOut">
               <a:rPr lang="en-DE" smtClean="0"/>
-              <a:t>05/06/2023</a:t>
+              <a:t>06/06/2023</a:t>
             </a:fld>
             <a:endParaRPr lang="en-DE"/>
           </a:p>
@@ -2090,7 +2095,7 @@
           <a:p>
             <a:fld id="{7E7ECEF8-20CD-4468-A5E5-CDF973CB3EBF}" type="datetimeFigureOut">
               <a:rPr lang="en-DE" smtClean="0"/>
-              <a:t>05/06/2023</a:t>
+              <a:t>06/06/2023</a:t>
             </a:fld>
             <a:endParaRPr lang="en-DE"/>
           </a:p>
@@ -2403,7 +2408,7 @@
           <a:p>
             <a:fld id="{7E7ECEF8-20CD-4468-A5E5-CDF973CB3EBF}" type="datetimeFigureOut">
               <a:rPr lang="en-DE" smtClean="0"/>
-              <a:t>05/06/2023</a:t>
+              <a:t>06/06/2023</a:t>
             </a:fld>
             <a:endParaRPr lang="en-DE"/>
           </a:p>
@@ -2692,7 +2697,7 @@
           <a:p>
             <a:fld id="{7E7ECEF8-20CD-4468-A5E5-CDF973CB3EBF}" type="datetimeFigureOut">
               <a:rPr lang="en-DE" smtClean="0"/>
-              <a:t>05/06/2023</a:t>
+              <a:t>06/06/2023</a:t>
             </a:fld>
             <a:endParaRPr lang="en-DE"/>
           </a:p>
@@ -2935,7 +2940,7 @@
           <a:p>
             <a:fld id="{7E7ECEF8-20CD-4468-A5E5-CDF973CB3EBF}" type="datetimeFigureOut">
               <a:rPr lang="en-DE" smtClean="0"/>
-              <a:t>05/06/2023</a:t>
+              <a:t>06/06/2023</a:t>
             </a:fld>
             <a:endParaRPr lang="en-DE"/>
           </a:p>
@@ -3478,6 +3483,338 @@
 </p:sld>
 </file>
 
+<file path=ppt/slides/slide10.xml><?xml version="1.0" encoding="utf-8"?>
+<p:sld xmlns:a="http://schemas.openxmlformats.org/drawingml/2006/main" xmlns:r="http://schemas.openxmlformats.org/officeDocument/2006/relationships" xmlns:p="http://schemas.openxmlformats.org/presentationml/2006/main">
+  <p:cSld>
+    <p:spTree>
+      <p:nvGrpSpPr>
+        <p:cNvPr id="1" name=""/>
+        <p:cNvGrpSpPr/>
+        <p:nvPr/>
+      </p:nvGrpSpPr>
+      <p:grpSpPr>
+        <a:xfrm>
+          <a:off x="0" y="0"/>
+          <a:ext cx="0" cy="0"/>
+          <a:chOff x="0" y="0"/>
+          <a:chExt cx="0" cy="0"/>
+        </a:xfrm>
+      </p:grpSpPr>
+      <p:sp>
+        <p:nvSpPr>
+          <p:cNvPr id="3" name="Content Placeholder 2">
+            <a:extLst>
+              <a:ext uri="{FF2B5EF4-FFF2-40B4-BE49-F238E27FC236}">
+                <a16:creationId xmlns:a16="http://schemas.microsoft.com/office/drawing/2014/main" id="{7AAB7A08-B79B-4E35-82B8-34BC44A3E81E}"/>
+              </a:ext>
+            </a:extLst>
+          </p:cNvPr>
+          <p:cNvSpPr>
+            <a:spLocks noGrp="1"/>
+          </p:cNvSpPr>
+          <p:nvPr>
+            <p:ph idx="1"/>
+          </p:nvPr>
+        </p:nvSpPr>
+        <p:spPr>
+          <a:xfrm>
+            <a:off x="838200" y="606425"/>
+            <a:ext cx="10515600" cy="881716"/>
+          </a:xfrm>
+        </p:spPr>
+        <p:txBody>
+          <a:bodyPr>
+            <a:normAutofit fontScale="92500" lnSpcReduction="10000"/>
+          </a:bodyPr>
+          <a:lstStyle/>
+          <a:p>
+            <a:pPr marL="0" indent="0">
+              <a:buNone/>
+            </a:pPr>
+            <a:r>
+              <a:rPr lang="en-US" dirty="0"/>
+              <a:t>Reward (pass, fail, shirk) = 2, -2, 0.5;  effort (work, shirk) = -0.4, 0</a:t>
+            </a:r>
+          </a:p>
+          <a:p>
+            <a:pPr marL="0" indent="0">
+              <a:buNone/>
+            </a:pPr>
+            <a:r>
+              <a:rPr lang="en-US" dirty="0"/>
+              <a:t>Efficacy = 0.9</a:t>
+            </a:r>
+            <a:endParaRPr lang="en-DE" dirty="0"/>
+          </a:p>
+        </p:txBody>
+      </p:sp>
+      <p:pic>
+        <p:nvPicPr>
+          <p:cNvPr id="4" name="Picture 3">
+            <a:extLst>
+              <a:ext uri="{FF2B5EF4-FFF2-40B4-BE49-F238E27FC236}">
+                <a16:creationId xmlns:a16="http://schemas.microsoft.com/office/drawing/2014/main" id="{C3FEAF67-E42E-441C-B5B8-C0D8C5BEB5E8}"/>
+              </a:ext>
+            </a:extLst>
+          </p:cNvPr>
+          <p:cNvPicPr>
+            <a:picLocks noChangeAspect="1"/>
+          </p:cNvPicPr>
+          <p:nvPr/>
+        </p:nvPicPr>
+        <p:blipFill>
+          <a:blip r:embed="rId2"/>
+          <a:stretch>
+            <a:fillRect/>
+          </a:stretch>
+        </p:blipFill>
+        <p:spPr>
+          <a:xfrm>
+            <a:off x="5809129" y="2176031"/>
+            <a:ext cx="5257800" cy="3889479"/>
+          </a:xfrm>
+          <a:prstGeom prst="rect">
+            <a:avLst/>
+          </a:prstGeom>
+        </p:spPr>
+      </p:pic>
+      <p:pic>
+        <p:nvPicPr>
+          <p:cNvPr id="5" name="Picture 4">
+            <a:extLst>
+              <a:ext uri="{FF2B5EF4-FFF2-40B4-BE49-F238E27FC236}">
+                <a16:creationId xmlns:a16="http://schemas.microsoft.com/office/drawing/2014/main" id="{A9FAB846-9CA6-43C0-91CA-DCF524956344}"/>
+              </a:ext>
+            </a:extLst>
+          </p:cNvPr>
+          <p:cNvPicPr>
+            <a:picLocks noChangeAspect="1"/>
+          </p:cNvPicPr>
+          <p:nvPr/>
+        </p:nvPicPr>
+        <p:blipFill>
+          <a:blip r:embed="rId3"/>
+          <a:stretch>
+            <a:fillRect/>
+          </a:stretch>
+        </p:blipFill>
+        <p:spPr>
+          <a:xfrm>
+            <a:off x="127788" y="2176031"/>
+            <a:ext cx="5257799" cy="3889479"/>
+          </a:xfrm>
+          <a:prstGeom prst="rect">
+            <a:avLst/>
+          </a:prstGeom>
+        </p:spPr>
+      </p:pic>
+      <p:sp>
+        <p:nvSpPr>
+          <p:cNvPr id="6" name="TextBox 5">
+            <a:extLst>
+              <a:ext uri="{FF2B5EF4-FFF2-40B4-BE49-F238E27FC236}">
+                <a16:creationId xmlns:a16="http://schemas.microsoft.com/office/drawing/2014/main" id="{29DF9E8C-A17F-4BC0-81B5-A386ED1176E4}"/>
+              </a:ext>
+            </a:extLst>
+          </p:cNvPr>
+          <p:cNvSpPr txBox="1"/>
+          <p:nvPr/>
+        </p:nvSpPr>
+        <p:spPr>
+          <a:xfrm>
+            <a:off x="1306128" y="1806699"/>
+            <a:ext cx="3529263" cy="369332"/>
+          </a:xfrm>
+          <a:prstGeom prst="rect">
+            <a:avLst/>
+          </a:prstGeom>
+          <a:noFill/>
+        </p:spPr>
+        <p:txBody>
+          <a:bodyPr wrap="square" rtlCol="0">
+            <a:spAutoFit/>
+          </a:bodyPr>
+          <a:lstStyle/>
+          <a:p>
+            <a:r>
+              <a:rPr lang="en-US" dirty="0"/>
+              <a:t>Discount = 1.0</a:t>
+            </a:r>
+          </a:p>
+        </p:txBody>
+      </p:sp>
+      <p:sp>
+        <p:nvSpPr>
+          <p:cNvPr id="7" name="TextBox 6">
+            <a:extLst>
+              <a:ext uri="{FF2B5EF4-FFF2-40B4-BE49-F238E27FC236}">
+                <a16:creationId xmlns:a16="http://schemas.microsoft.com/office/drawing/2014/main" id="{9256DC5F-BD75-4897-BDC0-BC8EC123E2E3}"/>
+              </a:ext>
+            </a:extLst>
+          </p:cNvPr>
+          <p:cNvSpPr txBox="1"/>
+          <p:nvPr/>
+        </p:nvSpPr>
+        <p:spPr>
+          <a:xfrm>
+            <a:off x="7593444" y="1806699"/>
+            <a:ext cx="3529263" cy="369332"/>
+          </a:xfrm>
+          <a:prstGeom prst="rect">
+            <a:avLst/>
+          </a:prstGeom>
+          <a:noFill/>
+        </p:spPr>
+        <p:txBody>
+          <a:bodyPr wrap="square" rtlCol="0">
+            <a:spAutoFit/>
+          </a:bodyPr>
+          <a:lstStyle/>
+          <a:p>
+            <a:r>
+              <a:rPr lang="en-US" dirty="0"/>
+              <a:t>Discount = 0.9</a:t>
+            </a:r>
+          </a:p>
+        </p:txBody>
+      </p:sp>
+    </p:spTree>
+    <p:extLst>
+      <p:ext uri="{BB962C8B-B14F-4D97-AF65-F5344CB8AC3E}">
+        <p14:creationId xmlns:p14="http://schemas.microsoft.com/office/powerpoint/2010/main" val="426463795"/>
+      </p:ext>
+    </p:extLst>
+  </p:cSld>
+  <p:clrMapOvr>
+    <a:masterClrMapping/>
+  </p:clrMapOvr>
+</p:sld>
+</file>
+
+<file path=ppt/slides/slide11.xml><?xml version="1.0" encoding="utf-8"?>
+<p:sld xmlns:a="http://schemas.openxmlformats.org/drawingml/2006/main" xmlns:r="http://schemas.openxmlformats.org/officeDocument/2006/relationships" xmlns:p="http://schemas.openxmlformats.org/presentationml/2006/main">
+  <p:cSld>
+    <p:spTree>
+      <p:nvGrpSpPr>
+        <p:cNvPr id="1" name=""/>
+        <p:cNvGrpSpPr/>
+        <p:nvPr/>
+      </p:nvGrpSpPr>
+      <p:grpSpPr>
+        <a:xfrm>
+          <a:off x="0" y="0"/>
+          <a:ext cx="0" cy="0"/>
+          <a:chOff x="0" y="0"/>
+          <a:chExt cx="0" cy="0"/>
+        </a:xfrm>
+      </p:grpSpPr>
+      <p:sp>
+        <p:nvSpPr>
+          <p:cNvPr id="8" name="Content Placeholder 7">
+            <a:extLst>
+              <a:ext uri="{FF2B5EF4-FFF2-40B4-BE49-F238E27FC236}">
+                <a16:creationId xmlns:a16="http://schemas.microsoft.com/office/drawing/2014/main" id="{0AEC17F7-C8C5-476C-8E65-B8EE09477ACE}"/>
+              </a:ext>
+            </a:extLst>
+          </p:cNvPr>
+          <p:cNvSpPr>
+            <a:spLocks noGrp="1"/>
+          </p:cNvSpPr>
+          <p:nvPr>
+            <p:ph idx="1"/>
+          </p:nvPr>
+        </p:nvSpPr>
+        <p:spPr>
+          <a:xfrm>
+            <a:off x="838200" y="409201"/>
+            <a:ext cx="10515600" cy="953434"/>
+          </a:xfrm>
+        </p:spPr>
+        <p:txBody>
+          <a:bodyPr/>
+          <a:lstStyle/>
+          <a:p>
+            <a:r>
+              <a:rPr lang="en-US" dirty="0" err="1"/>
+              <a:t>fwsaf</a:t>
+            </a:r>
+            <a:endParaRPr lang="en-DE" dirty="0"/>
+          </a:p>
+        </p:txBody>
+      </p:sp>
+      <p:pic>
+        <p:nvPicPr>
+          <p:cNvPr id="10" name="Picture 9">
+            <a:extLst>
+              <a:ext uri="{FF2B5EF4-FFF2-40B4-BE49-F238E27FC236}">
+                <a16:creationId xmlns:a16="http://schemas.microsoft.com/office/drawing/2014/main" id="{4BA07D29-9BD7-4E0A-8B1B-6D36E2A3DC19}"/>
+              </a:ext>
+            </a:extLst>
+          </p:cNvPr>
+          <p:cNvPicPr>
+            <a:picLocks noChangeAspect="1"/>
+          </p:cNvPicPr>
+          <p:nvPr/>
+        </p:nvPicPr>
+        <p:blipFill>
+          <a:blip r:embed="rId2"/>
+          <a:stretch>
+            <a:fillRect/>
+          </a:stretch>
+        </p:blipFill>
+        <p:spPr>
+          <a:xfrm>
+            <a:off x="1508449" y="1111624"/>
+            <a:ext cx="3511786" cy="2758273"/>
+          </a:xfrm>
+          <a:prstGeom prst="rect">
+            <a:avLst/>
+          </a:prstGeom>
+        </p:spPr>
+      </p:pic>
+      <p:pic>
+        <p:nvPicPr>
+          <p:cNvPr id="11" name="Picture 10">
+            <a:extLst>
+              <a:ext uri="{FF2B5EF4-FFF2-40B4-BE49-F238E27FC236}">
+                <a16:creationId xmlns:a16="http://schemas.microsoft.com/office/drawing/2014/main" id="{28E619F4-0DA2-482C-8D02-EF05FAE9C488}"/>
+              </a:ext>
+            </a:extLst>
+          </p:cNvPr>
+          <p:cNvPicPr>
+            <a:picLocks noChangeAspect="1"/>
+          </p:cNvPicPr>
+          <p:nvPr/>
+        </p:nvPicPr>
+        <p:blipFill>
+          <a:blip r:embed="rId3"/>
+          <a:stretch>
+            <a:fillRect/>
+          </a:stretch>
+        </p:blipFill>
+        <p:spPr>
+          <a:xfrm>
+            <a:off x="1441139" y="3998260"/>
+            <a:ext cx="3640972" cy="2859740"/>
+          </a:xfrm>
+          <a:prstGeom prst="rect">
+            <a:avLst/>
+          </a:prstGeom>
+        </p:spPr>
+      </p:pic>
+    </p:spTree>
+    <p:extLst>
+      <p:ext uri="{BB962C8B-B14F-4D97-AF65-F5344CB8AC3E}">
+        <p14:creationId xmlns:p14="http://schemas.microsoft.com/office/powerpoint/2010/main" val="3345019860"/>
+      </p:ext>
+    </p:extLst>
+  </p:cSld>
+  <p:clrMapOvr>
+    <a:masterClrMapping/>
+  </p:clrMapOvr>
+</p:sld>
+</file>
+
 <file path=ppt/slides/slide2.xml><?xml version="1.0" encoding="utf-8"?>
 <p:sld xmlns:a="http://schemas.openxmlformats.org/drawingml/2006/main" xmlns:r="http://schemas.openxmlformats.org/officeDocument/2006/relationships" xmlns:p="http://schemas.openxmlformats.org/presentationml/2006/main">
   <p:cSld>
@@ -3755,236 +4092,64 @@
       </p:grpSpPr>
       <p:sp>
         <p:nvSpPr>
-          <p:cNvPr id="2" name="Title 1">
-            <a:extLst>
-              <a:ext uri="{FF2B5EF4-FFF2-40B4-BE49-F238E27FC236}">
-                <a16:creationId xmlns:a16="http://schemas.microsoft.com/office/drawing/2014/main" id="{5B335F12-C4BE-47B4-9624-960354C595B5}"/>
-              </a:ext>
-            </a:extLst>
-          </p:cNvPr>
-          <p:cNvSpPr>
-            <a:spLocks noGrp="1"/>
-          </p:cNvSpPr>
-          <p:nvPr>
-            <p:ph type="title"/>
+          <p:cNvPr id="4" name="Title 3">
+            <a:extLst>
+              <a:ext uri="{FF2B5EF4-FFF2-40B4-BE49-F238E27FC236}">
+                <a16:creationId xmlns:a16="http://schemas.microsoft.com/office/drawing/2014/main" id="{DCD3CE40-8589-4AC1-9C43-B21669ABE2AB}"/>
+              </a:ext>
+            </a:extLst>
+          </p:cNvPr>
+          <p:cNvSpPr>
+            <a:spLocks noGrp="1"/>
+          </p:cNvSpPr>
+          <p:nvPr>
+            <p:ph type="ctrTitle"/>
           </p:nvPr>
         </p:nvSpPr>
         <p:spPr/>
         <p:txBody>
           <a:bodyPr>
-            <a:normAutofit/>
+            <a:normAutofit fontScale="90000"/>
           </a:bodyPr>
           <a:lstStyle/>
           <a:p>
             <a:r>
-              <a:rPr lang="en-US" sz="3000" dirty="0"/>
-              <a:t>Reward (pass, fail, shirk) = 2, -2, 0.5;  effort (work, shirk) = -0.4, 0</a:t>
-            </a:r>
-            <a:endParaRPr lang="en-DE" sz="3000" dirty="0"/>
-          </a:p>
-        </p:txBody>
-      </p:sp>
-      <p:sp>
-        <p:nvSpPr>
-          <p:cNvPr id="3" name="Content Placeholder 2">
-            <a:extLst>
-              <a:ext uri="{FF2B5EF4-FFF2-40B4-BE49-F238E27FC236}">
-                <a16:creationId xmlns:a16="http://schemas.microsoft.com/office/drawing/2014/main" id="{5E6A30B3-654C-4E38-AA52-7B0A357FAA4F}"/>
-              </a:ext>
-            </a:extLst>
-          </p:cNvPr>
-          <p:cNvSpPr>
-            <a:spLocks noGrp="1"/>
-          </p:cNvSpPr>
-          <p:nvPr>
-            <p:ph idx="1"/>
-          </p:nvPr>
-        </p:nvSpPr>
-        <p:spPr>
-          <a:xfrm>
-            <a:off x="838200" y="1825625"/>
-            <a:ext cx="10515600" cy="957680"/>
-          </a:xfrm>
-        </p:spPr>
-        <p:txBody>
-          <a:bodyPr>
-            <a:normAutofit/>
-          </a:bodyPr>
-          <a:lstStyle/>
-          <a:p>
-            <a:pPr marL="0" indent="0">
-              <a:buNone/>
-            </a:pPr>
-            <a:r>
-              <a:rPr lang="en-US" sz="2400" dirty="0" err="1"/>
-              <a:t>Discount_factor</a:t>
-            </a:r>
-            <a:r>
-              <a:rPr lang="en-US" sz="2400" dirty="0"/>
-              <a:t> = 1.0 (no discounting future value)</a:t>
-            </a:r>
-          </a:p>
-          <a:p>
-            <a:pPr marL="0" indent="0">
-              <a:buNone/>
-            </a:pPr>
-            <a:r>
-              <a:rPr lang="en-US" sz="2400" dirty="0" err="1"/>
-              <a:t>reward_completed</a:t>
-            </a:r>
-            <a:r>
-              <a:rPr lang="en-US" sz="2400" dirty="0"/>
-              <a:t> = 0</a:t>
-            </a:r>
-          </a:p>
-          <a:p>
-            <a:pPr marL="0" indent="0">
-              <a:buNone/>
-            </a:pPr>
-            <a:endParaRPr lang="en-US" sz="2400" dirty="0"/>
-          </a:p>
-          <a:p>
-            <a:pPr marL="0" indent="0">
-              <a:buNone/>
-            </a:pPr>
-            <a:endParaRPr lang="en-DE" sz="2000" dirty="0"/>
-          </a:p>
-        </p:txBody>
-      </p:sp>
-      <p:sp>
-        <p:nvSpPr>
-          <p:cNvPr id="5" name="TextBox 4">
-            <a:extLst>
-              <a:ext uri="{FF2B5EF4-FFF2-40B4-BE49-F238E27FC236}">
-                <a16:creationId xmlns:a16="http://schemas.microsoft.com/office/drawing/2014/main" id="{43FA3384-43C3-4564-ACC7-BA193E027BF6}"/>
-              </a:ext>
-            </a:extLst>
-          </p:cNvPr>
-          <p:cNvSpPr txBox="1"/>
-          <p:nvPr/>
-        </p:nvSpPr>
-        <p:spPr>
-          <a:xfrm>
-            <a:off x="1965158" y="3022968"/>
-            <a:ext cx="3529263" cy="369332"/>
-          </a:xfrm>
-          <a:prstGeom prst="rect">
-            <a:avLst/>
-          </a:prstGeom>
-          <a:noFill/>
-        </p:spPr>
-        <p:txBody>
-          <a:bodyPr wrap="square" rtlCol="0">
-            <a:spAutoFit/>
-          </a:bodyPr>
-          <a:lstStyle/>
-          <a:p>
-            <a:r>
               <a:rPr lang="en-US" dirty="0"/>
-              <a:t>efficacy = 0.9</a:t>
-            </a:r>
-          </a:p>
-        </p:txBody>
-      </p:sp>
-      <p:pic>
-        <p:nvPicPr>
-          <p:cNvPr id="6" name="Picture 5">
-            <a:extLst>
-              <a:ext uri="{FF2B5EF4-FFF2-40B4-BE49-F238E27FC236}">
-                <a16:creationId xmlns:a16="http://schemas.microsoft.com/office/drawing/2014/main" id="{6804DE7D-ABF1-4573-A9A4-186227AB3937}"/>
-              </a:ext>
-            </a:extLst>
-          </p:cNvPr>
-          <p:cNvPicPr>
-            <a:picLocks noChangeAspect="1"/>
-          </p:cNvPicPr>
-          <p:nvPr/>
-        </p:nvPicPr>
-        <p:blipFill>
-          <a:blip r:embed="rId2"/>
-          <a:stretch>
-            <a:fillRect/>
-          </a:stretch>
-        </p:blipFill>
-        <p:spPr>
-          <a:xfrm>
-            <a:off x="1813372" y="3429000"/>
-            <a:ext cx="3636917" cy="2705330"/>
-          </a:xfrm>
-          <a:prstGeom prst="rect">
-            <a:avLst/>
-          </a:prstGeom>
-        </p:spPr>
-      </p:pic>
-      <p:pic>
-        <p:nvPicPr>
-          <p:cNvPr id="7" name="Picture 6">
-            <a:extLst>
-              <a:ext uri="{FF2B5EF4-FFF2-40B4-BE49-F238E27FC236}">
-                <a16:creationId xmlns:a16="http://schemas.microsoft.com/office/drawing/2014/main" id="{A69C2553-C019-42F8-A925-E1F6BABF6C80}"/>
-              </a:ext>
-            </a:extLst>
-          </p:cNvPr>
-          <p:cNvPicPr>
-            <a:picLocks noChangeAspect="1"/>
-          </p:cNvPicPr>
-          <p:nvPr/>
-        </p:nvPicPr>
-        <p:blipFill>
-          <a:blip r:embed="rId3"/>
-          <a:stretch>
-            <a:fillRect/>
-          </a:stretch>
-        </p:blipFill>
-        <p:spPr>
-          <a:xfrm>
-            <a:off x="5825604" y="3443905"/>
-            <a:ext cx="3636917" cy="2690425"/>
-          </a:xfrm>
-          <a:prstGeom prst="rect">
-            <a:avLst/>
-          </a:prstGeom>
-        </p:spPr>
-      </p:pic>
-      <p:sp>
-        <p:nvSpPr>
-          <p:cNvPr id="8" name="TextBox 7">
-            <a:extLst>
-              <a:ext uri="{FF2B5EF4-FFF2-40B4-BE49-F238E27FC236}">
-                <a16:creationId xmlns:a16="http://schemas.microsoft.com/office/drawing/2014/main" id="{91DF1FE9-F2A5-4F32-98CE-F2A1F02354B1}"/>
-              </a:ext>
-            </a:extLst>
-          </p:cNvPr>
-          <p:cNvSpPr txBox="1"/>
-          <p:nvPr/>
-        </p:nvSpPr>
-        <p:spPr>
-          <a:xfrm>
-            <a:off x="5967663" y="2990884"/>
-            <a:ext cx="3529263" cy="369332"/>
-          </a:xfrm>
-          <a:prstGeom prst="rect">
-            <a:avLst/>
-          </a:prstGeom>
-          <a:noFill/>
-        </p:spPr>
-        <p:txBody>
-          <a:bodyPr wrap="square" rtlCol="0">
-            <a:spAutoFit/>
-          </a:bodyPr>
-          <a:lstStyle/>
-          <a:p>
-            <a:r>
-              <a:rPr lang="en-US" dirty="0"/>
-              <a:t>efficacy = 0.6</a:t>
-            </a:r>
+              <a:t>Why is it optimal to continue working once working becomes optimal</a:t>
+            </a:r>
+            <a:endParaRPr lang="en-DE" dirty="0"/>
+          </a:p>
+        </p:txBody>
+      </p:sp>
+      <p:sp>
+        <p:nvSpPr>
+          <p:cNvPr id="5" name="Subtitle 4">
+            <a:extLst>
+              <a:ext uri="{FF2B5EF4-FFF2-40B4-BE49-F238E27FC236}">
+                <a16:creationId xmlns:a16="http://schemas.microsoft.com/office/drawing/2014/main" id="{A8441AA9-7539-4F8E-801C-FE78BACAFFB4}"/>
+              </a:ext>
+            </a:extLst>
+          </p:cNvPr>
+          <p:cNvSpPr>
+            <a:spLocks noGrp="1"/>
+          </p:cNvSpPr>
+          <p:nvPr>
+            <p:ph type="subTitle" idx="1"/>
+          </p:nvPr>
+        </p:nvSpPr>
+        <p:spPr/>
+        <p:txBody>
+          <a:bodyPr/>
+          <a:lstStyle/>
+          <a:p>
+            <a:endParaRPr lang="en-DE"/>
           </a:p>
         </p:txBody>
       </p:sp>
     </p:spTree>
     <p:extLst>
       <p:ext uri="{BB962C8B-B14F-4D97-AF65-F5344CB8AC3E}">
-        <p14:creationId xmlns:p14="http://schemas.microsoft.com/office/powerpoint/2010/main" val="2483527023"/>
+        <p14:creationId xmlns:p14="http://schemas.microsoft.com/office/powerpoint/2010/main" val="14084315"/>
       </p:ext>
     </p:extLst>
   </p:cSld>
@@ -4013,10 +4178,41 @@
       </p:grpSpPr>
       <p:sp>
         <p:nvSpPr>
+          <p:cNvPr id="2" name="Title 1">
+            <a:extLst>
+              <a:ext uri="{FF2B5EF4-FFF2-40B4-BE49-F238E27FC236}">
+                <a16:creationId xmlns:a16="http://schemas.microsoft.com/office/drawing/2014/main" id="{5B335F12-C4BE-47B4-9624-960354C595B5}"/>
+              </a:ext>
+            </a:extLst>
+          </p:cNvPr>
+          <p:cNvSpPr>
+            <a:spLocks noGrp="1"/>
+          </p:cNvSpPr>
+          <p:nvPr>
+            <p:ph type="title"/>
+          </p:nvPr>
+        </p:nvSpPr>
+        <p:spPr/>
+        <p:txBody>
+          <a:bodyPr>
+            <a:normAutofit/>
+          </a:bodyPr>
+          <a:lstStyle/>
+          <a:p>
+            <a:r>
+              <a:rPr lang="en-US" sz="3000" dirty="0"/>
+              <a:t>Reward (pass, fail, shirk) = 2, -2, 0.5;  effort (work, shirk) = -0.4, 0</a:t>
+            </a:r>
+            <a:endParaRPr lang="en-DE" sz="3000" dirty="0"/>
+          </a:p>
+        </p:txBody>
+      </p:sp>
+      <p:sp>
+        <p:nvSpPr>
           <p:cNvPr id="3" name="Content Placeholder 2">
             <a:extLst>
               <a:ext uri="{FF2B5EF4-FFF2-40B4-BE49-F238E27FC236}">
-                <a16:creationId xmlns:a16="http://schemas.microsoft.com/office/drawing/2014/main" id="{8DD34CF5-62BF-4E62-BE8E-B8933E71EAEC}"/>
+                <a16:creationId xmlns:a16="http://schemas.microsoft.com/office/drawing/2014/main" id="{5E6A30B3-654C-4E38-AA52-7B0A357FAA4F}"/>
               </a:ext>
             </a:extLst>
           </p:cNvPr>
@@ -4029,52 +4225,96 @@
         </p:nvSpPr>
         <p:spPr>
           <a:xfrm>
-            <a:off x="385011" y="802105"/>
-            <a:ext cx="10968789" cy="1034716"/>
-          </a:xfrm>
-        </p:spPr>
-        <p:txBody>
-          <a:bodyPr/>
+            <a:off x="838200" y="1825625"/>
+            <a:ext cx="10515600" cy="957680"/>
+          </a:xfrm>
+        </p:spPr>
+        <p:txBody>
+          <a:bodyPr>
+            <a:normAutofit/>
+          </a:bodyPr>
           <a:lstStyle/>
           <a:p>
             <a:pPr marL="0" indent="0">
               <a:buNone/>
             </a:pPr>
             <a:r>
-              <a:rPr lang="en-US" dirty="0" err="1"/>
+              <a:rPr lang="en-US" sz="2400" dirty="0" err="1"/>
               <a:t>Discount_factor</a:t>
             </a:r>
             <a:r>
+              <a:rPr lang="en-US" sz="2400" dirty="0"/>
+              <a:t> = 1.0 (no discounting future value)</a:t>
+            </a:r>
+          </a:p>
+          <a:p>
+            <a:pPr marL="0" indent="0">
+              <a:buNone/>
+            </a:pPr>
+            <a:r>
+              <a:rPr lang="en-US" sz="2400" dirty="0" err="1"/>
+              <a:t>reward_completed</a:t>
+            </a:r>
+            <a:r>
+              <a:rPr lang="en-US" sz="2400" dirty="0"/>
+              <a:t> = 0</a:t>
+            </a:r>
+          </a:p>
+          <a:p>
+            <a:pPr marL="0" indent="0">
+              <a:buNone/>
+            </a:pPr>
+            <a:endParaRPr lang="en-US" sz="2400" dirty="0"/>
+          </a:p>
+          <a:p>
+            <a:pPr marL="0" indent="0">
+              <a:buNone/>
+            </a:pPr>
+            <a:endParaRPr lang="en-DE" sz="2000" dirty="0"/>
+          </a:p>
+        </p:txBody>
+      </p:sp>
+      <p:sp>
+        <p:nvSpPr>
+          <p:cNvPr id="5" name="TextBox 4">
+            <a:extLst>
+              <a:ext uri="{FF2B5EF4-FFF2-40B4-BE49-F238E27FC236}">
+                <a16:creationId xmlns:a16="http://schemas.microsoft.com/office/drawing/2014/main" id="{43FA3384-43C3-4564-ACC7-BA193E027BF6}"/>
+              </a:ext>
+            </a:extLst>
+          </p:cNvPr>
+          <p:cNvSpPr txBox="1"/>
+          <p:nvPr/>
+        </p:nvSpPr>
+        <p:spPr>
+          <a:xfrm>
+            <a:off x="1965158" y="3022968"/>
+            <a:ext cx="3529263" cy="369332"/>
+          </a:xfrm>
+          <a:prstGeom prst="rect">
+            <a:avLst/>
+          </a:prstGeom>
+          <a:noFill/>
+        </p:spPr>
+        <p:txBody>
+          <a:bodyPr wrap="square" rtlCol="0">
+            <a:spAutoFit/>
+          </a:bodyPr>
+          <a:lstStyle/>
+          <a:p>
+            <a:r>
               <a:rPr lang="en-US" dirty="0"/>
-              <a:t> = 1.0 (no discounting future value)</a:t>
-            </a:r>
-          </a:p>
-          <a:p>
-            <a:pPr marL="0" indent="0">
-              <a:buNone/>
-            </a:pPr>
-            <a:r>
-              <a:rPr lang="en-US" dirty="0" err="1"/>
-              <a:t>reward_completed</a:t>
-            </a:r>
-            <a:r>
-              <a:rPr lang="en-US" dirty="0"/>
-              <a:t> = </a:t>
-            </a:r>
-            <a:r>
-              <a:rPr lang="en-US" dirty="0" err="1"/>
-              <a:t>reward_shirk</a:t>
-            </a:r>
-            <a:endParaRPr lang="en-DE" dirty="0"/>
+              <a:t>efficacy = 0.9</a:t>
+            </a:r>
           </a:p>
         </p:txBody>
       </p:sp>
       <p:pic>
         <p:nvPicPr>
-          <p:cNvPr id="4" name="Picture 3">
-            <a:extLst>
-              <a:ext uri="{FF2B5EF4-FFF2-40B4-BE49-F238E27FC236}">
-                <a16:creationId xmlns:a16="http://schemas.microsoft.com/office/drawing/2014/main" id="{B939939C-A36E-41CB-8AE7-04A64AF3EA0E}"/>
+          <p:cNvPr id="6" name="Picture 5">
+            <a:extLst>
+              <a:ext uri="{FF2B5EF4-FFF2-40B4-BE49-F238E27FC236}">
+                <a16:creationId xmlns:a16="http://schemas.microsoft.com/office/drawing/2014/main" id="{6804DE7D-ABF1-4573-A9A4-186227AB3937}"/>
               </a:ext>
             </a:extLst>
           </p:cNvPr>
@@ -4091,55 +4331,20 @@
         </p:blipFill>
         <p:spPr>
           <a:xfrm>
-            <a:off x="385011" y="2727158"/>
-            <a:ext cx="3539921" cy="2618672"/>
+            <a:off x="1813372" y="3429000"/>
+            <a:ext cx="3636917" cy="2705330"/>
           </a:xfrm>
           <a:prstGeom prst="rect">
             <a:avLst/>
           </a:prstGeom>
         </p:spPr>
       </p:pic>
-      <p:sp>
-        <p:nvSpPr>
-          <p:cNvPr id="5" name="TextBox 4">
-            <a:extLst>
-              <a:ext uri="{FF2B5EF4-FFF2-40B4-BE49-F238E27FC236}">
-                <a16:creationId xmlns:a16="http://schemas.microsoft.com/office/drawing/2014/main" id="{9EA34336-373C-4511-AD0F-56F7A5FE26A6}"/>
-              </a:ext>
-            </a:extLst>
-          </p:cNvPr>
-          <p:cNvSpPr txBox="1"/>
-          <p:nvPr/>
-        </p:nvSpPr>
-        <p:spPr>
-          <a:xfrm>
-            <a:off x="624810" y="2286073"/>
-            <a:ext cx="3529263" cy="369332"/>
-          </a:xfrm>
-          <a:prstGeom prst="rect">
-            <a:avLst/>
-          </a:prstGeom>
-          <a:noFill/>
-        </p:spPr>
-        <p:txBody>
-          <a:bodyPr wrap="square" rtlCol="0">
-            <a:spAutoFit/>
-          </a:bodyPr>
-          <a:lstStyle/>
-          <a:p>
-            <a:r>
-              <a:rPr lang="en-US" dirty="0"/>
-              <a:t>efficacy = 0.9, effort = -0.4</a:t>
-            </a:r>
-          </a:p>
-        </p:txBody>
-      </p:sp>
       <p:pic>
         <p:nvPicPr>
-          <p:cNvPr id="6" name="Picture 5">
-            <a:extLst>
-              <a:ext uri="{FF2B5EF4-FFF2-40B4-BE49-F238E27FC236}">
-                <a16:creationId xmlns:a16="http://schemas.microsoft.com/office/drawing/2014/main" id="{3B6C3263-1823-4099-876E-2B40E5B00D75}"/>
+          <p:cNvPr id="7" name="Picture 6">
+            <a:extLst>
+              <a:ext uri="{FF2B5EF4-FFF2-40B4-BE49-F238E27FC236}">
+                <a16:creationId xmlns:a16="http://schemas.microsoft.com/office/drawing/2014/main" id="{A69C2553-C019-42F8-A925-E1F6BABF6C80}"/>
               </a:ext>
             </a:extLst>
           </p:cNvPr>
@@ -4156,7 +4361,7 @@
         </p:blipFill>
         <p:spPr>
           <a:xfrm>
-            <a:off x="4154073" y="2691281"/>
+            <a:off x="5825604" y="3443905"/>
             <a:ext cx="3636917" cy="2690425"/>
           </a:xfrm>
           <a:prstGeom prst="rect">
@@ -4166,10 +4371,10 @@
       </p:pic>
       <p:sp>
         <p:nvSpPr>
-          <p:cNvPr id="7" name="TextBox 6">
-            <a:extLst>
-              <a:ext uri="{FF2B5EF4-FFF2-40B4-BE49-F238E27FC236}">
-                <a16:creationId xmlns:a16="http://schemas.microsoft.com/office/drawing/2014/main" id="{3CAF61C4-8EAA-4942-90A0-098A1FB438BC}"/>
+          <p:cNvPr id="8" name="TextBox 7">
+            <a:extLst>
+              <a:ext uri="{FF2B5EF4-FFF2-40B4-BE49-F238E27FC236}">
+                <a16:creationId xmlns:a16="http://schemas.microsoft.com/office/drawing/2014/main" id="{91DF1FE9-F2A5-4F32-98CE-F2A1F02354B1}"/>
               </a:ext>
             </a:extLst>
           </p:cNvPr>
@@ -4178,7 +4383,7 @@
         </p:nvSpPr>
         <p:spPr>
           <a:xfrm>
-            <a:off x="4331368" y="2286073"/>
+            <a:off x="5967663" y="2990884"/>
             <a:ext cx="3529263" cy="369332"/>
           </a:xfrm>
           <a:prstGeom prst="rect">
@@ -4194,72 +4399,7 @@
           <a:p>
             <a:r>
               <a:rPr lang="en-US" dirty="0"/>
-              <a:t>efficacy = 0.6, effort = -0.4</a:t>
-            </a:r>
-          </a:p>
-        </p:txBody>
-      </p:sp>
-      <p:pic>
-        <p:nvPicPr>
-          <p:cNvPr id="8" name="Picture 7">
-            <a:extLst>
-              <a:ext uri="{FF2B5EF4-FFF2-40B4-BE49-F238E27FC236}">
-                <a16:creationId xmlns:a16="http://schemas.microsoft.com/office/drawing/2014/main" id="{6FE16A1F-713B-44A1-A919-A5857369BBF7}"/>
-              </a:ext>
-            </a:extLst>
-          </p:cNvPr>
-          <p:cNvPicPr>
-            <a:picLocks noChangeAspect="1"/>
-          </p:cNvPicPr>
-          <p:nvPr/>
-        </p:nvPicPr>
-        <p:blipFill>
-          <a:blip r:embed="rId4"/>
-          <a:stretch>
-            <a:fillRect/>
-          </a:stretch>
-        </p:blipFill>
-        <p:spPr>
-          <a:xfrm>
-            <a:off x="8020130" y="2691280"/>
-            <a:ext cx="3636917" cy="2690425"/>
-          </a:xfrm>
-          <a:prstGeom prst="rect">
-            <a:avLst/>
-          </a:prstGeom>
-        </p:spPr>
-      </p:pic>
-      <p:sp>
-        <p:nvSpPr>
-          <p:cNvPr id="9" name="TextBox 8">
-            <a:extLst>
-              <a:ext uri="{FF2B5EF4-FFF2-40B4-BE49-F238E27FC236}">
-                <a16:creationId xmlns:a16="http://schemas.microsoft.com/office/drawing/2014/main" id="{FB961E6F-C122-4817-BFDF-80B7A2F8F9CA}"/>
-              </a:ext>
-            </a:extLst>
-          </p:cNvPr>
-          <p:cNvSpPr txBox="1"/>
-          <p:nvPr/>
-        </p:nvSpPr>
-        <p:spPr>
-          <a:xfrm>
-            <a:off x="8197517" y="2278125"/>
-            <a:ext cx="3529263" cy="369332"/>
-          </a:xfrm>
-          <a:prstGeom prst="rect">
-            <a:avLst/>
-          </a:prstGeom>
-          <a:noFill/>
-        </p:spPr>
-        <p:txBody>
-          <a:bodyPr wrap="square" rtlCol="0">
-            <a:spAutoFit/>
-          </a:bodyPr>
-          <a:lstStyle/>
-          <a:p>
-            <a:r>
-              <a:rPr lang="en-US" dirty="0"/>
-              <a:t>efficacy = 0.6, effort = -1.0</a:t>
+              <a:t>efficacy = 0.6</a:t>
             </a:r>
           </a:p>
         </p:txBody>
@@ -4267,7 +4407,7 @@
     </p:spTree>
     <p:extLst>
       <p:ext uri="{BB962C8B-B14F-4D97-AF65-F5344CB8AC3E}">
-        <p14:creationId xmlns:p14="http://schemas.microsoft.com/office/powerpoint/2010/main" val="3049530470"/>
+        <p14:creationId xmlns:p14="http://schemas.microsoft.com/office/powerpoint/2010/main" val="2483527023"/>
       </p:ext>
     </p:extLst>
   </p:cSld>
@@ -4299,7 +4439,7 @@
           <p:cNvPr id="3" name="Content Placeholder 2">
             <a:extLst>
               <a:ext uri="{FF2B5EF4-FFF2-40B4-BE49-F238E27FC236}">
-                <a16:creationId xmlns:a16="http://schemas.microsoft.com/office/drawing/2014/main" id="{24D88D0E-AE2E-4D1E-AEE3-895660A03DD9}"/>
+                <a16:creationId xmlns:a16="http://schemas.microsoft.com/office/drawing/2014/main" id="{8DD34CF5-62BF-4E62-BE8E-B8933E71EAEC}"/>
               </a:ext>
             </a:extLst>
           </p:cNvPr>
@@ -4312,14 +4452,12 @@
         </p:nvSpPr>
         <p:spPr>
           <a:xfrm>
-            <a:off x="1087704" y="712286"/>
-            <a:ext cx="8954654" cy="771609"/>
-          </a:xfrm>
-        </p:spPr>
-        <p:txBody>
-          <a:bodyPr>
-            <a:normAutofit fontScale="85000" lnSpcReduction="20000"/>
-          </a:bodyPr>
+            <a:off x="385011" y="802105"/>
+            <a:ext cx="10968789" cy="1034716"/>
+          </a:xfrm>
+        </p:spPr>
+        <p:txBody>
+          <a:bodyPr/>
           <a:lstStyle/>
           <a:p>
             <a:pPr marL="0" indent="0">
@@ -4331,7 +4469,7 @@
             </a:r>
             <a:r>
               <a:rPr lang="en-US" dirty="0"/>
-              <a:t> = 0.9</a:t>
+              <a:t> = 1.0 (no discounting future value)</a:t>
             </a:r>
           </a:p>
           <a:p>
@@ -4350,16 +4488,6 @@
               <a:rPr lang="en-US" dirty="0" err="1"/>
               <a:t>reward_shirk</a:t>
             </a:r>
-            <a:r>
-              <a:rPr lang="en-US" dirty="0"/>
-              <a:t>, efficacy = 0.9, effort = -0.4</a:t>
-            </a:r>
-            <a:endParaRPr lang="en-DE" dirty="0"/>
-          </a:p>
-          <a:p>
-            <a:pPr marL="0" indent="0">
-              <a:buNone/>
-            </a:pPr>
             <a:endParaRPr lang="en-DE" dirty="0"/>
           </a:p>
         </p:txBody>
@@ -4369,7 +4497,7 @@
           <p:cNvPr id="4" name="Picture 3">
             <a:extLst>
               <a:ext uri="{FF2B5EF4-FFF2-40B4-BE49-F238E27FC236}">
-                <a16:creationId xmlns:a16="http://schemas.microsoft.com/office/drawing/2014/main" id="{E31CE652-95ED-4D6A-8894-5688E354A03C}"/>
+                <a16:creationId xmlns:a16="http://schemas.microsoft.com/office/drawing/2014/main" id="{B939939C-A36E-41CB-8AE7-04A64AF3EA0E}"/>
               </a:ext>
             </a:extLst>
           </p:cNvPr>
@@ -4386,6 +4514,301 @@
         </p:blipFill>
         <p:spPr>
           <a:xfrm>
+            <a:off x="385011" y="2727158"/>
+            <a:ext cx="3539921" cy="2618672"/>
+          </a:xfrm>
+          <a:prstGeom prst="rect">
+            <a:avLst/>
+          </a:prstGeom>
+        </p:spPr>
+      </p:pic>
+      <p:sp>
+        <p:nvSpPr>
+          <p:cNvPr id="5" name="TextBox 4">
+            <a:extLst>
+              <a:ext uri="{FF2B5EF4-FFF2-40B4-BE49-F238E27FC236}">
+                <a16:creationId xmlns:a16="http://schemas.microsoft.com/office/drawing/2014/main" id="{9EA34336-373C-4511-AD0F-56F7A5FE26A6}"/>
+              </a:ext>
+            </a:extLst>
+          </p:cNvPr>
+          <p:cNvSpPr txBox="1"/>
+          <p:nvPr/>
+        </p:nvSpPr>
+        <p:spPr>
+          <a:xfrm>
+            <a:off x="624810" y="2286073"/>
+            <a:ext cx="3529263" cy="369332"/>
+          </a:xfrm>
+          <a:prstGeom prst="rect">
+            <a:avLst/>
+          </a:prstGeom>
+          <a:noFill/>
+        </p:spPr>
+        <p:txBody>
+          <a:bodyPr wrap="square" rtlCol="0">
+            <a:spAutoFit/>
+          </a:bodyPr>
+          <a:lstStyle/>
+          <a:p>
+            <a:r>
+              <a:rPr lang="en-US" dirty="0"/>
+              <a:t>efficacy = 0.9, effort = -0.4</a:t>
+            </a:r>
+          </a:p>
+        </p:txBody>
+      </p:sp>
+      <p:pic>
+        <p:nvPicPr>
+          <p:cNvPr id="6" name="Picture 5">
+            <a:extLst>
+              <a:ext uri="{FF2B5EF4-FFF2-40B4-BE49-F238E27FC236}">
+                <a16:creationId xmlns:a16="http://schemas.microsoft.com/office/drawing/2014/main" id="{3B6C3263-1823-4099-876E-2B40E5B00D75}"/>
+              </a:ext>
+            </a:extLst>
+          </p:cNvPr>
+          <p:cNvPicPr>
+            <a:picLocks noChangeAspect="1"/>
+          </p:cNvPicPr>
+          <p:nvPr/>
+        </p:nvPicPr>
+        <p:blipFill>
+          <a:blip r:embed="rId3"/>
+          <a:stretch>
+            <a:fillRect/>
+          </a:stretch>
+        </p:blipFill>
+        <p:spPr>
+          <a:xfrm>
+            <a:off x="4154073" y="2691281"/>
+            <a:ext cx="3636917" cy="2690425"/>
+          </a:xfrm>
+          <a:prstGeom prst="rect">
+            <a:avLst/>
+          </a:prstGeom>
+        </p:spPr>
+      </p:pic>
+      <p:sp>
+        <p:nvSpPr>
+          <p:cNvPr id="7" name="TextBox 6">
+            <a:extLst>
+              <a:ext uri="{FF2B5EF4-FFF2-40B4-BE49-F238E27FC236}">
+                <a16:creationId xmlns:a16="http://schemas.microsoft.com/office/drawing/2014/main" id="{3CAF61C4-8EAA-4942-90A0-098A1FB438BC}"/>
+              </a:ext>
+            </a:extLst>
+          </p:cNvPr>
+          <p:cNvSpPr txBox="1"/>
+          <p:nvPr/>
+        </p:nvSpPr>
+        <p:spPr>
+          <a:xfrm>
+            <a:off x="4331368" y="2286073"/>
+            <a:ext cx="3529263" cy="369332"/>
+          </a:xfrm>
+          <a:prstGeom prst="rect">
+            <a:avLst/>
+          </a:prstGeom>
+          <a:noFill/>
+        </p:spPr>
+        <p:txBody>
+          <a:bodyPr wrap="square" rtlCol="0">
+            <a:spAutoFit/>
+          </a:bodyPr>
+          <a:lstStyle/>
+          <a:p>
+            <a:r>
+              <a:rPr lang="en-US" dirty="0"/>
+              <a:t>efficacy = 0.6, effort = -0.4</a:t>
+            </a:r>
+          </a:p>
+        </p:txBody>
+      </p:sp>
+      <p:pic>
+        <p:nvPicPr>
+          <p:cNvPr id="8" name="Picture 7">
+            <a:extLst>
+              <a:ext uri="{FF2B5EF4-FFF2-40B4-BE49-F238E27FC236}">
+                <a16:creationId xmlns:a16="http://schemas.microsoft.com/office/drawing/2014/main" id="{6FE16A1F-713B-44A1-A919-A5857369BBF7}"/>
+              </a:ext>
+            </a:extLst>
+          </p:cNvPr>
+          <p:cNvPicPr>
+            <a:picLocks noChangeAspect="1"/>
+          </p:cNvPicPr>
+          <p:nvPr/>
+        </p:nvPicPr>
+        <p:blipFill>
+          <a:blip r:embed="rId4"/>
+          <a:stretch>
+            <a:fillRect/>
+          </a:stretch>
+        </p:blipFill>
+        <p:spPr>
+          <a:xfrm>
+            <a:off x="8020130" y="2691280"/>
+            <a:ext cx="3636917" cy="2690425"/>
+          </a:xfrm>
+          <a:prstGeom prst="rect">
+            <a:avLst/>
+          </a:prstGeom>
+        </p:spPr>
+      </p:pic>
+      <p:sp>
+        <p:nvSpPr>
+          <p:cNvPr id="9" name="TextBox 8">
+            <a:extLst>
+              <a:ext uri="{FF2B5EF4-FFF2-40B4-BE49-F238E27FC236}">
+                <a16:creationId xmlns:a16="http://schemas.microsoft.com/office/drawing/2014/main" id="{FB961E6F-C122-4817-BFDF-80B7A2F8F9CA}"/>
+              </a:ext>
+            </a:extLst>
+          </p:cNvPr>
+          <p:cNvSpPr txBox="1"/>
+          <p:nvPr/>
+        </p:nvSpPr>
+        <p:spPr>
+          <a:xfrm>
+            <a:off x="8197517" y="2278125"/>
+            <a:ext cx="3529263" cy="369332"/>
+          </a:xfrm>
+          <a:prstGeom prst="rect">
+            <a:avLst/>
+          </a:prstGeom>
+          <a:noFill/>
+        </p:spPr>
+        <p:txBody>
+          <a:bodyPr wrap="square" rtlCol="0">
+            <a:spAutoFit/>
+          </a:bodyPr>
+          <a:lstStyle/>
+          <a:p>
+            <a:r>
+              <a:rPr lang="en-US" dirty="0"/>
+              <a:t>efficacy = 0.6, effort = -1.0</a:t>
+            </a:r>
+          </a:p>
+        </p:txBody>
+      </p:sp>
+    </p:spTree>
+    <p:extLst>
+      <p:ext uri="{BB962C8B-B14F-4D97-AF65-F5344CB8AC3E}">
+        <p14:creationId xmlns:p14="http://schemas.microsoft.com/office/powerpoint/2010/main" val="3049530470"/>
+      </p:ext>
+    </p:extLst>
+  </p:cSld>
+  <p:clrMapOvr>
+    <a:masterClrMapping/>
+  </p:clrMapOvr>
+</p:sld>
+</file>
+
+<file path=ppt/slides/slide7.xml><?xml version="1.0" encoding="utf-8"?>
+<p:sld xmlns:a="http://schemas.openxmlformats.org/drawingml/2006/main" xmlns:r="http://schemas.openxmlformats.org/officeDocument/2006/relationships" xmlns:p="http://schemas.openxmlformats.org/presentationml/2006/main">
+  <p:cSld>
+    <p:spTree>
+      <p:nvGrpSpPr>
+        <p:cNvPr id="1" name=""/>
+        <p:cNvGrpSpPr/>
+        <p:nvPr/>
+      </p:nvGrpSpPr>
+      <p:grpSpPr>
+        <a:xfrm>
+          <a:off x="0" y="0"/>
+          <a:ext cx="0" cy="0"/>
+          <a:chOff x="0" y="0"/>
+          <a:chExt cx="0" cy="0"/>
+        </a:xfrm>
+      </p:grpSpPr>
+      <p:sp>
+        <p:nvSpPr>
+          <p:cNvPr id="3" name="Content Placeholder 2">
+            <a:extLst>
+              <a:ext uri="{FF2B5EF4-FFF2-40B4-BE49-F238E27FC236}">
+                <a16:creationId xmlns:a16="http://schemas.microsoft.com/office/drawing/2014/main" id="{24D88D0E-AE2E-4D1E-AEE3-895660A03DD9}"/>
+              </a:ext>
+            </a:extLst>
+          </p:cNvPr>
+          <p:cNvSpPr>
+            <a:spLocks noGrp="1"/>
+          </p:cNvSpPr>
+          <p:nvPr>
+            <p:ph idx="1"/>
+          </p:nvPr>
+        </p:nvSpPr>
+        <p:spPr>
+          <a:xfrm>
+            <a:off x="1087704" y="712286"/>
+            <a:ext cx="8954654" cy="771609"/>
+          </a:xfrm>
+        </p:spPr>
+        <p:txBody>
+          <a:bodyPr>
+            <a:normAutofit fontScale="85000" lnSpcReduction="20000"/>
+          </a:bodyPr>
+          <a:lstStyle/>
+          <a:p>
+            <a:pPr marL="0" indent="0">
+              <a:buNone/>
+            </a:pPr>
+            <a:r>
+              <a:rPr lang="en-US" dirty="0" err="1"/>
+              <a:t>Discount_factor</a:t>
+            </a:r>
+            <a:r>
+              <a:rPr lang="en-US" dirty="0"/>
+              <a:t> = 0.9</a:t>
+            </a:r>
+          </a:p>
+          <a:p>
+            <a:pPr marL="0" indent="0">
+              <a:buNone/>
+            </a:pPr>
+            <a:r>
+              <a:rPr lang="en-US" dirty="0" err="1"/>
+              <a:t>reward_completed</a:t>
+            </a:r>
+            <a:r>
+              <a:rPr lang="en-US" dirty="0"/>
+              <a:t> = </a:t>
+            </a:r>
+            <a:r>
+              <a:rPr lang="en-US" dirty="0" err="1"/>
+              <a:t>reward_shirk</a:t>
+            </a:r>
+            <a:r>
+              <a:rPr lang="en-US" dirty="0"/>
+              <a:t>, efficacy = 0.9, effort = -0.4</a:t>
+            </a:r>
+            <a:endParaRPr lang="en-DE" dirty="0"/>
+          </a:p>
+          <a:p>
+            <a:pPr marL="0" indent="0">
+              <a:buNone/>
+            </a:pPr>
+            <a:endParaRPr lang="en-DE" dirty="0"/>
+          </a:p>
+        </p:txBody>
+      </p:sp>
+      <p:pic>
+        <p:nvPicPr>
+          <p:cNvPr id="4" name="Picture 3">
+            <a:extLst>
+              <a:ext uri="{FF2B5EF4-FFF2-40B4-BE49-F238E27FC236}">
+                <a16:creationId xmlns:a16="http://schemas.microsoft.com/office/drawing/2014/main" id="{E31CE652-95ED-4D6A-8894-5688E354A03C}"/>
+              </a:ext>
+            </a:extLst>
+          </p:cNvPr>
+          <p:cNvPicPr>
+            <a:picLocks noChangeAspect="1"/>
+          </p:cNvPicPr>
+          <p:nvPr/>
+        </p:nvPicPr>
+        <p:blipFill>
+          <a:blip r:embed="rId2"/>
+          <a:stretch>
+            <a:fillRect/>
+          </a:stretch>
+        </p:blipFill>
+        <p:spPr>
+          <a:xfrm>
             <a:off x="1087704" y="2208086"/>
             <a:ext cx="4301511" cy="3182061"/>
           </a:xfrm>
@@ -4398,6 +4821,256 @@
     <p:extLst>
       <p:ext uri="{BB962C8B-B14F-4D97-AF65-F5344CB8AC3E}">
         <p14:creationId xmlns:p14="http://schemas.microsoft.com/office/powerpoint/2010/main" val="3481179119"/>
+      </p:ext>
+    </p:extLst>
+  </p:cSld>
+  <p:clrMapOvr>
+    <a:masterClrMapping/>
+  </p:clrMapOvr>
+</p:sld>
+</file>
+
+<file path=ppt/slides/slide8.xml><?xml version="1.0" encoding="utf-8"?>
+<p:sld xmlns:a="http://schemas.openxmlformats.org/drawingml/2006/main" xmlns:r="http://schemas.openxmlformats.org/officeDocument/2006/relationships" xmlns:p="http://schemas.openxmlformats.org/presentationml/2006/main">
+  <p:cSld>
+    <p:spTree>
+      <p:nvGrpSpPr>
+        <p:cNvPr id="1" name=""/>
+        <p:cNvGrpSpPr/>
+        <p:nvPr/>
+      </p:nvGrpSpPr>
+      <p:grpSpPr>
+        <a:xfrm>
+          <a:off x="0" y="0"/>
+          <a:ext cx="0" cy="0"/>
+          <a:chOff x="0" y="0"/>
+          <a:chExt cx="0" cy="0"/>
+        </a:xfrm>
+      </p:grpSpPr>
+      <p:sp>
+        <p:nvSpPr>
+          <p:cNvPr id="2" name="Title 1">
+            <a:extLst>
+              <a:ext uri="{FF2B5EF4-FFF2-40B4-BE49-F238E27FC236}">
+                <a16:creationId xmlns:a16="http://schemas.microsoft.com/office/drawing/2014/main" id="{0DCC177C-97C0-4281-A0D0-2D51BFADB8C0}"/>
+              </a:ext>
+            </a:extLst>
+          </p:cNvPr>
+          <p:cNvSpPr>
+            <a:spLocks noGrp="1"/>
+          </p:cNvSpPr>
+          <p:nvPr>
+            <p:ph type="title"/>
+          </p:nvPr>
+        </p:nvSpPr>
+        <p:spPr/>
+        <p:txBody>
+          <a:bodyPr>
+            <a:normAutofit fontScale="90000"/>
+          </a:bodyPr>
+          <a:lstStyle/>
+          <a:p>
+            <a:r>
+              <a:rPr lang="en-US" dirty="0"/>
+              <a:t>With rewards on completing, the </a:t>
+            </a:r>
+            <a:r>
+              <a:rPr lang="en-US" dirty="0" err="1"/>
+              <a:t>reward_shirk</a:t>
+            </a:r>
+            <a:r>
+              <a:rPr lang="en-US" dirty="0"/>
+              <a:t> doesn’t have to be very small for it to be worth working ; but qualitatively similar results as before</a:t>
+            </a:r>
+            <a:endParaRPr lang="en-DE" dirty="0"/>
+          </a:p>
+        </p:txBody>
+      </p:sp>
+      <p:sp>
+        <p:nvSpPr>
+          <p:cNvPr id="3" name="Content Placeholder 2">
+            <a:extLst>
+              <a:ext uri="{FF2B5EF4-FFF2-40B4-BE49-F238E27FC236}">
+                <a16:creationId xmlns:a16="http://schemas.microsoft.com/office/drawing/2014/main" id="{AB58BEBA-EE5C-43FB-9CF6-2F439DF59272}"/>
+              </a:ext>
+            </a:extLst>
+          </p:cNvPr>
+          <p:cNvSpPr>
+            <a:spLocks noGrp="1"/>
+          </p:cNvSpPr>
+          <p:nvPr>
+            <p:ph idx="1"/>
+          </p:nvPr>
+        </p:nvSpPr>
+        <p:spPr>
+          <a:xfrm>
+            <a:off x="838200" y="2141537"/>
+            <a:ext cx="10515600" cy="4351338"/>
+          </a:xfrm>
+        </p:spPr>
+        <p:txBody>
+          <a:bodyPr/>
+          <a:lstStyle/>
+          <a:p>
+            <a:pPr marL="0" indent="0">
+              <a:buNone/>
+            </a:pPr>
+            <a:r>
+              <a:rPr lang="en-US" dirty="0"/>
+              <a:t>Discount = 0.9, N = 10</a:t>
+            </a:r>
+            <a:endParaRPr lang="en-DE" dirty="0"/>
+          </a:p>
+        </p:txBody>
+      </p:sp>
+      <p:pic>
+        <p:nvPicPr>
+          <p:cNvPr id="5" name="Picture 4">
+            <a:extLst>
+              <a:ext uri="{FF2B5EF4-FFF2-40B4-BE49-F238E27FC236}">
+                <a16:creationId xmlns:a16="http://schemas.microsoft.com/office/drawing/2014/main" id="{6D4E794D-FB85-4DC2-80B4-F78D3BE07D56}"/>
+              </a:ext>
+            </a:extLst>
+          </p:cNvPr>
+          <p:cNvPicPr>
+            <a:picLocks noChangeAspect="1"/>
+          </p:cNvPicPr>
+          <p:nvPr/>
+        </p:nvPicPr>
+        <p:blipFill>
+          <a:blip r:embed="rId2"/>
+          <a:stretch>
+            <a:fillRect/>
+          </a:stretch>
+        </p:blipFill>
+        <p:spPr>
+          <a:xfrm>
+            <a:off x="610358" y="2683420"/>
+            <a:ext cx="5168528" cy="4059533"/>
+          </a:xfrm>
+          <a:prstGeom prst="rect">
+            <a:avLst/>
+          </a:prstGeom>
+        </p:spPr>
+      </p:pic>
+      <p:pic>
+        <p:nvPicPr>
+          <p:cNvPr id="6" name="Picture 5">
+            <a:extLst>
+              <a:ext uri="{FF2B5EF4-FFF2-40B4-BE49-F238E27FC236}">
+                <a16:creationId xmlns:a16="http://schemas.microsoft.com/office/drawing/2014/main" id="{EF21F7FE-AB9F-45A9-9B93-368499C605FE}"/>
+              </a:ext>
+            </a:extLst>
+          </p:cNvPr>
+          <p:cNvPicPr>
+            <a:picLocks noChangeAspect="1"/>
+          </p:cNvPicPr>
+          <p:nvPr/>
+        </p:nvPicPr>
+        <p:blipFill>
+          <a:blip r:embed="rId3"/>
+          <a:stretch>
+            <a:fillRect/>
+          </a:stretch>
+        </p:blipFill>
+        <p:spPr>
+          <a:xfrm>
+            <a:off x="6413114" y="2683420"/>
+            <a:ext cx="5168528" cy="4174580"/>
+          </a:xfrm>
+          <a:prstGeom prst="rect">
+            <a:avLst/>
+          </a:prstGeom>
+        </p:spPr>
+      </p:pic>
+    </p:spTree>
+    <p:extLst>
+      <p:ext uri="{BB962C8B-B14F-4D97-AF65-F5344CB8AC3E}">
+        <p14:creationId xmlns:p14="http://schemas.microsoft.com/office/powerpoint/2010/main" val="1528261856"/>
+      </p:ext>
+    </p:extLst>
+  </p:cSld>
+  <p:clrMapOvr>
+    <a:masterClrMapping/>
+  </p:clrMapOvr>
+</p:sld>
+</file>
+
+<file path=ppt/slides/slide9.xml><?xml version="1.0" encoding="utf-8"?>
+<p:sld xmlns:a="http://schemas.openxmlformats.org/drawingml/2006/main" xmlns:r="http://schemas.openxmlformats.org/officeDocument/2006/relationships" xmlns:p="http://schemas.openxmlformats.org/presentationml/2006/main">
+  <p:cSld>
+    <p:spTree>
+      <p:nvGrpSpPr>
+        <p:cNvPr id="1" name=""/>
+        <p:cNvGrpSpPr/>
+        <p:nvPr/>
+      </p:nvGrpSpPr>
+      <p:grpSpPr>
+        <a:xfrm>
+          <a:off x="0" y="0"/>
+          <a:ext cx="0" cy="0"/>
+          <a:chOff x="0" y="0"/>
+          <a:chExt cx="0" cy="0"/>
+        </a:xfrm>
+      </p:grpSpPr>
+      <p:sp>
+        <p:nvSpPr>
+          <p:cNvPr id="4" name="Title 3">
+            <a:extLst>
+              <a:ext uri="{FF2B5EF4-FFF2-40B4-BE49-F238E27FC236}">
+                <a16:creationId xmlns:a16="http://schemas.microsoft.com/office/drawing/2014/main" id="{B6959298-68F7-485B-8103-4758A723E43E}"/>
+              </a:ext>
+            </a:extLst>
+          </p:cNvPr>
+          <p:cNvSpPr>
+            <a:spLocks noGrp="1"/>
+          </p:cNvSpPr>
+          <p:nvPr>
+            <p:ph type="ctrTitle"/>
+          </p:nvPr>
+        </p:nvSpPr>
+        <p:spPr/>
+        <p:txBody>
+          <a:bodyPr/>
+          <a:lstStyle/>
+          <a:p>
+            <a:r>
+              <a:rPr lang="en-US" dirty="0"/>
+              <a:t>Including an intermediate state</a:t>
+            </a:r>
+            <a:endParaRPr lang="en-DE" dirty="0"/>
+          </a:p>
+        </p:txBody>
+      </p:sp>
+      <p:sp>
+        <p:nvSpPr>
+          <p:cNvPr id="5" name="Subtitle 4">
+            <a:extLst>
+              <a:ext uri="{FF2B5EF4-FFF2-40B4-BE49-F238E27FC236}">
+                <a16:creationId xmlns:a16="http://schemas.microsoft.com/office/drawing/2014/main" id="{453AEFB0-A515-447D-ADA6-2086E5C4D212}"/>
+              </a:ext>
+            </a:extLst>
+          </p:cNvPr>
+          <p:cNvSpPr>
+            <a:spLocks noGrp="1"/>
+          </p:cNvSpPr>
+          <p:nvPr>
+            <p:ph type="subTitle" idx="1"/>
+          </p:nvPr>
+        </p:nvSpPr>
+        <p:spPr/>
+        <p:txBody>
+          <a:bodyPr/>
+          <a:lstStyle/>
+          <a:p>
+            <a:endParaRPr lang="en-DE"/>
+          </a:p>
+        </p:txBody>
+      </p:sp>
+    </p:spTree>
+    <p:extLst>
+      <p:ext uri="{BB962C8B-B14F-4D97-AF65-F5344CB8AC3E}">
+        <p14:creationId xmlns:p14="http://schemas.microsoft.com/office/powerpoint/2010/main" val="2598486537"/>
       </p:ext>
     </p:extLst>
   </p:cSld>

</xml_diff>

<commit_message>
some plots with intermediate state
</commit_message>
<xml_diff>
--- a/results and plots/Presentation1.pptx
+++ b/results and plots/Presentation1.pptx
@@ -3708,40 +3708,6 @@
           <a:chExt cx="0" cy="0"/>
         </a:xfrm>
       </p:grpSpPr>
-      <p:sp>
-        <p:nvSpPr>
-          <p:cNvPr id="8" name="Content Placeholder 7">
-            <a:extLst>
-              <a:ext uri="{FF2B5EF4-FFF2-40B4-BE49-F238E27FC236}">
-                <a16:creationId xmlns:a16="http://schemas.microsoft.com/office/drawing/2014/main" id="{0AEC17F7-C8C5-476C-8E65-B8EE09477ACE}"/>
-              </a:ext>
-            </a:extLst>
-          </p:cNvPr>
-          <p:cNvSpPr>
-            <a:spLocks noGrp="1"/>
-          </p:cNvSpPr>
-          <p:nvPr>
-            <p:ph idx="1"/>
-          </p:nvPr>
-        </p:nvSpPr>
-        <p:spPr>
-          <a:xfrm>
-            <a:off x="838200" y="409201"/>
-            <a:ext cx="10515600" cy="953434"/>
-          </a:xfrm>
-        </p:spPr>
-        <p:txBody>
-          <a:bodyPr/>
-          <a:lstStyle/>
-          <a:p>
-            <a:r>
-              <a:rPr lang="en-US" dirty="0" err="1"/>
-              <a:t>fwsaf</a:t>
-            </a:r>
-            <a:endParaRPr lang="en-DE" dirty="0"/>
-          </a:p>
-        </p:txBody>
-      </p:sp>
       <p:pic>
         <p:nvPicPr>
           <p:cNvPr id="10" name="Picture 9">
@@ -3802,6 +3768,53 @@
           </a:prstGeom>
         </p:spPr>
       </p:pic>
+      <p:sp>
+        <p:nvSpPr>
+          <p:cNvPr id="4" name="Content Placeholder 2">
+            <a:extLst>
+              <a:ext uri="{FF2B5EF4-FFF2-40B4-BE49-F238E27FC236}">
+                <a16:creationId xmlns:a16="http://schemas.microsoft.com/office/drawing/2014/main" id="{D27089F8-5C07-C78F-14BD-6A51BC5B8755}"/>
+              </a:ext>
+            </a:extLst>
+          </p:cNvPr>
+          <p:cNvSpPr>
+            <a:spLocks noGrp="1"/>
+          </p:cNvSpPr>
+          <p:nvPr>
+            <p:ph idx="1"/>
+          </p:nvPr>
+        </p:nvSpPr>
+        <p:spPr>
+          <a:xfrm>
+            <a:off x="838200" y="229908"/>
+            <a:ext cx="10515600" cy="881716"/>
+          </a:xfrm>
+        </p:spPr>
+        <p:txBody>
+          <a:bodyPr>
+            <a:normAutofit/>
+          </a:bodyPr>
+          <a:lstStyle/>
+          <a:p>
+            <a:pPr marL="0" indent="0">
+              <a:buNone/>
+            </a:pPr>
+            <a:r>
+              <a:rPr lang="en-US" dirty="0" err="1"/>
+              <a:t>Reward_pass</a:t>
+            </a:r>
+            <a:r>
+              <a:rPr lang="en-US" dirty="0"/>
+              <a:t> = -fail</a:t>
+            </a:r>
+            <a:r>
+              <a:rPr lang="en-US"/>
+              <a:t>;  discount = 0.9</a:t>
+            </a:r>
+            <a:endParaRPr lang="en-US" dirty="0"/>
+          </a:p>
+        </p:txBody>
+      </p:sp>
     </p:spTree>
     <p:extLst>
       <p:ext uri="{BB962C8B-B14F-4D97-AF65-F5344CB8AC3E}">

</xml_diff>

<commit_message>
run forward runs and find no. of completed runs
</commit_message>
<xml_diff>
--- a/results and plots/Presentation1.pptx
+++ b/results and plots/Presentation1.pptx
@@ -16,6 +16,7 @@
     <p:sldId id="265" r:id="rId10"/>
     <p:sldId id="263" r:id="rId11"/>
     <p:sldId id="264" r:id="rId12"/>
+    <p:sldId id="268" r:id="rId13"/>
   </p:sldIdLst>
   <p:sldSz cx="12192000" cy="6858000"/>
   <p:notesSz cx="6858000" cy="9144000"/>
@@ -271,7 +272,7 @@
           <a:p>
             <a:fld id="{7E7ECEF8-20CD-4468-A5E5-CDF973CB3EBF}" type="datetimeFigureOut">
               <a:rPr lang="en-DE" smtClean="0"/>
-              <a:t>07/06/2023</a:t>
+              <a:t>19/06/2023</a:t>
             </a:fld>
             <a:endParaRPr lang="en-DE"/>
           </a:p>
@@ -471,7 +472,7 @@
           <a:p>
             <a:fld id="{7E7ECEF8-20CD-4468-A5E5-CDF973CB3EBF}" type="datetimeFigureOut">
               <a:rPr lang="en-DE" smtClean="0"/>
-              <a:t>07/06/2023</a:t>
+              <a:t>19/06/2023</a:t>
             </a:fld>
             <a:endParaRPr lang="en-DE"/>
           </a:p>
@@ -681,7 +682,7 @@
           <a:p>
             <a:fld id="{7E7ECEF8-20CD-4468-A5E5-CDF973CB3EBF}" type="datetimeFigureOut">
               <a:rPr lang="en-DE" smtClean="0"/>
-              <a:t>07/06/2023</a:t>
+              <a:t>19/06/2023</a:t>
             </a:fld>
             <a:endParaRPr lang="en-DE"/>
           </a:p>
@@ -881,7 +882,7 @@
           <a:p>
             <a:fld id="{7E7ECEF8-20CD-4468-A5E5-CDF973CB3EBF}" type="datetimeFigureOut">
               <a:rPr lang="en-DE" smtClean="0"/>
-              <a:t>07/06/2023</a:t>
+              <a:t>19/06/2023</a:t>
             </a:fld>
             <a:endParaRPr lang="en-DE"/>
           </a:p>
@@ -1157,7 +1158,7 @@
           <a:p>
             <a:fld id="{7E7ECEF8-20CD-4468-A5E5-CDF973CB3EBF}" type="datetimeFigureOut">
               <a:rPr lang="en-DE" smtClean="0"/>
-              <a:t>07/06/2023</a:t>
+              <a:t>19/06/2023</a:t>
             </a:fld>
             <a:endParaRPr lang="en-DE"/>
           </a:p>
@@ -1425,7 +1426,7 @@
           <a:p>
             <a:fld id="{7E7ECEF8-20CD-4468-A5E5-CDF973CB3EBF}" type="datetimeFigureOut">
               <a:rPr lang="en-DE" smtClean="0"/>
-              <a:t>07/06/2023</a:t>
+              <a:t>19/06/2023</a:t>
             </a:fld>
             <a:endParaRPr lang="en-DE"/>
           </a:p>
@@ -1840,7 +1841,7 @@
           <a:p>
             <a:fld id="{7E7ECEF8-20CD-4468-A5E5-CDF973CB3EBF}" type="datetimeFigureOut">
               <a:rPr lang="en-DE" smtClean="0"/>
-              <a:t>07/06/2023</a:t>
+              <a:t>19/06/2023</a:t>
             </a:fld>
             <a:endParaRPr lang="en-DE"/>
           </a:p>
@@ -1982,7 +1983,7 @@
           <a:p>
             <a:fld id="{7E7ECEF8-20CD-4468-A5E5-CDF973CB3EBF}" type="datetimeFigureOut">
               <a:rPr lang="en-DE" smtClean="0"/>
-              <a:t>07/06/2023</a:t>
+              <a:t>19/06/2023</a:t>
             </a:fld>
             <a:endParaRPr lang="en-DE"/>
           </a:p>
@@ -2095,7 +2096,7 @@
           <a:p>
             <a:fld id="{7E7ECEF8-20CD-4468-A5E5-CDF973CB3EBF}" type="datetimeFigureOut">
               <a:rPr lang="en-DE" smtClean="0"/>
-              <a:t>07/06/2023</a:t>
+              <a:t>19/06/2023</a:t>
             </a:fld>
             <a:endParaRPr lang="en-DE"/>
           </a:p>
@@ -2408,7 +2409,7 @@
           <a:p>
             <a:fld id="{7E7ECEF8-20CD-4468-A5E5-CDF973CB3EBF}" type="datetimeFigureOut">
               <a:rPr lang="en-DE" smtClean="0"/>
-              <a:t>07/06/2023</a:t>
+              <a:t>19/06/2023</a:t>
             </a:fld>
             <a:endParaRPr lang="en-DE"/>
           </a:p>
@@ -2697,7 +2698,7 @@
           <a:p>
             <a:fld id="{7E7ECEF8-20CD-4468-A5E5-CDF973CB3EBF}" type="datetimeFigureOut">
               <a:rPr lang="en-DE" smtClean="0"/>
-              <a:t>07/06/2023</a:t>
+              <a:t>19/06/2023</a:t>
             </a:fld>
             <a:endParaRPr lang="en-DE"/>
           </a:p>
@@ -2940,7 +2941,7 @@
           <a:p>
             <a:fld id="{7E7ECEF8-20CD-4468-A5E5-CDF973CB3EBF}" type="datetimeFigureOut">
               <a:rPr lang="en-DE" smtClean="0"/>
-              <a:t>07/06/2023</a:t>
+              <a:t>19/06/2023</a:t>
             </a:fld>
             <a:endParaRPr lang="en-DE"/>
           </a:p>
@@ -3891,6 +3892,317 @@
 </p:sld>
 </file>
 
+<file path=ppt/slides/slide12.xml><?xml version="1.0" encoding="utf-8"?>
+<p:sld xmlns:a="http://schemas.openxmlformats.org/drawingml/2006/main" xmlns:r="http://schemas.openxmlformats.org/officeDocument/2006/relationships" xmlns:p="http://schemas.openxmlformats.org/presentationml/2006/main">
+  <p:cSld>
+    <p:spTree>
+      <p:nvGrpSpPr>
+        <p:cNvPr id="1" name=""/>
+        <p:cNvGrpSpPr/>
+        <p:nvPr/>
+      </p:nvGrpSpPr>
+      <p:grpSpPr>
+        <a:xfrm>
+          <a:off x="0" y="0"/>
+          <a:ext cx="0" cy="0"/>
+          <a:chOff x="0" y="0"/>
+          <a:chExt cx="0" cy="0"/>
+        </a:xfrm>
+      </p:grpSpPr>
+      <p:sp>
+        <p:nvSpPr>
+          <p:cNvPr id="2" name="Title 1">
+            <a:extLst>
+              <a:ext uri="{FF2B5EF4-FFF2-40B4-BE49-F238E27FC236}">
+                <a16:creationId xmlns:a16="http://schemas.microsoft.com/office/drawing/2014/main" id="{3E69C841-AD22-4DB3-8B5A-D23AE92C166A}"/>
+              </a:ext>
+            </a:extLst>
+          </p:cNvPr>
+          <p:cNvSpPr>
+            <a:spLocks noGrp="1"/>
+          </p:cNvSpPr>
+          <p:nvPr>
+            <p:ph type="title"/>
+          </p:nvPr>
+        </p:nvSpPr>
+        <p:spPr/>
+        <p:txBody>
+          <a:bodyPr>
+            <a:normAutofit fontScale="90000"/>
+          </a:bodyPr>
+          <a:lstStyle/>
+          <a:p>
+            <a:r>
+              <a:rPr lang="en-US" dirty="0"/>
+              <a:t>Here, procrastination comes from delaying starting even if that leaves a possibility of not completing</a:t>
+            </a:r>
+            <a:br>
+              <a:rPr lang="en-US" dirty="0"/>
+            </a:br>
+            <a:r>
+              <a:rPr lang="en-US" dirty="0"/>
+              <a:t>Forward runs:</a:t>
+            </a:r>
+            <a:endParaRPr lang="en-DE" dirty="0"/>
+          </a:p>
+        </p:txBody>
+      </p:sp>
+      <p:pic>
+        <p:nvPicPr>
+          <p:cNvPr id="4" name="Content Placeholder 3">
+            <a:extLst>
+              <a:ext uri="{FF2B5EF4-FFF2-40B4-BE49-F238E27FC236}">
+                <a16:creationId xmlns:a16="http://schemas.microsoft.com/office/drawing/2014/main" id="{A3AD5BA2-BDA3-4665-BF97-6D8AFDA9590B}"/>
+              </a:ext>
+            </a:extLst>
+          </p:cNvPr>
+          <p:cNvPicPr>
+            <a:picLocks noGrp="1" noChangeAspect="1"/>
+          </p:cNvPicPr>
+          <p:nvPr>
+            <p:ph idx="1"/>
+          </p:nvPr>
+        </p:nvPicPr>
+        <p:blipFill>
+          <a:blip r:embed="rId2"/>
+          <a:stretch>
+            <a:fillRect/>
+          </a:stretch>
+        </p:blipFill>
+        <p:spPr>
+          <a:xfrm>
+            <a:off x="3065225" y="3047999"/>
+            <a:ext cx="5005325" cy="3741654"/>
+          </a:xfrm>
+          <a:prstGeom prst="rect">
+            <a:avLst/>
+          </a:prstGeom>
+        </p:spPr>
+      </p:pic>
+      <p:sp>
+        <p:nvSpPr>
+          <p:cNvPr id="5" name="Content Placeholder 2">
+            <a:extLst>
+              <a:ext uri="{FF2B5EF4-FFF2-40B4-BE49-F238E27FC236}">
+                <a16:creationId xmlns:a16="http://schemas.microsoft.com/office/drawing/2014/main" id="{C7BAE050-1446-4F8E-BACD-FBAFA9B49F92}"/>
+              </a:ext>
+            </a:extLst>
+          </p:cNvPr>
+          <p:cNvSpPr txBox="1">
+            <a:spLocks/>
+          </p:cNvSpPr>
+          <p:nvPr/>
+        </p:nvSpPr>
+        <p:spPr>
+          <a:xfrm>
+            <a:off x="3799340" y="2379078"/>
+            <a:ext cx="3860766" cy="588712"/>
+          </a:xfrm>
+          <a:prstGeom prst="rect">
+            <a:avLst/>
+          </a:prstGeom>
+        </p:spPr>
+        <p:txBody>
+          <a:bodyPr vert="horz" lIns="91440" tIns="45720" rIns="91440" bIns="45720" rtlCol="0">
+            <a:normAutofit fontScale="85000" lnSpcReduction="10000"/>
+          </a:bodyPr>
+          <a:lstStyle>
+            <a:lvl1pPr marL="228600" indent="-228600" algn="l" defTabSz="914400" rtl="0" eaLnBrk="1" latinLnBrk="0" hangingPunct="1">
+              <a:lnSpc>
+                <a:spcPct val="90000"/>
+              </a:lnSpc>
+              <a:spcBef>
+                <a:spcPts val="1000"/>
+              </a:spcBef>
+              <a:buFont typeface="Arial" panose="020B0604020202020204" pitchFamily="34" charset="0"/>
+              <a:buChar char="•"/>
+              <a:defRPr sz="2800" kern="1200">
+                <a:solidFill>
+                  <a:schemeClr val="tx1"/>
+                </a:solidFill>
+                <a:latin typeface="+mn-lt"/>
+                <a:ea typeface="+mn-ea"/>
+                <a:cs typeface="+mn-cs"/>
+              </a:defRPr>
+            </a:lvl1pPr>
+            <a:lvl2pPr marL="685800" indent="-228600" algn="l" defTabSz="914400" rtl="0" eaLnBrk="1" latinLnBrk="0" hangingPunct="1">
+              <a:lnSpc>
+                <a:spcPct val="90000"/>
+              </a:lnSpc>
+              <a:spcBef>
+                <a:spcPts val="500"/>
+              </a:spcBef>
+              <a:buFont typeface="Arial" panose="020B0604020202020204" pitchFamily="34" charset="0"/>
+              <a:buChar char="•"/>
+              <a:defRPr sz="2400" kern="1200">
+                <a:solidFill>
+                  <a:schemeClr val="tx1"/>
+                </a:solidFill>
+                <a:latin typeface="+mn-lt"/>
+                <a:ea typeface="+mn-ea"/>
+                <a:cs typeface="+mn-cs"/>
+              </a:defRPr>
+            </a:lvl2pPr>
+            <a:lvl3pPr marL="1143000" indent="-228600" algn="l" defTabSz="914400" rtl="0" eaLnBrk="1" latinLnBrk="0" hangingPunct="1">
+              <a:lnSpc>
+                <a:spcPct val="90000"/>
+              </a:lnSpc>
+              <a:spcBef>
+                <a:spcPts val="500"/>
+              </a:spcBef>
+              <a:buFont typeface="Arial" panose="020B0604020202020204" pitchFamily="34" charset="0"/>
+              <a:buChar char="•"/>
+              <a:defRPr sz="2000" kern="1200">
+                <a:solidFill>
+                  <a:schemeClr val="tx1"/>
+                </a:solidFill>
+                <a:latin typeface="+mn-lt"/>
+                <a:ea typeface="+mn-ea"/>
+                <a:cs typeface="+mn-cs"/>
+              </a:defRPr>
+            </a:lvl3pPr>
+            <a:lvl4pPr marL="1600200" indent="-228600" algn="l" defTabSz="914400" rtl="0" eaLnBrk="1" latinLnBrk="0" hangingPunct="1">
+              <a:lnSpc>
+                <a:spcPct val="90000"/>
+              </a:lnSpc>
+              <a:spcBef>
+                <a:spcPts val="500"/>
+              </a:spcBef>
+              <a:buFont typeface="Arial" panose="020B0604020202020204" pitchFamily="34" charset="0"/>
+              <a:buChar char="•"/>
+              <a:defRPr sz="1800" kern="1200">
+                <a:solidFill>
+                  <a:schemeClr val="tx1"/>
+                </a:solidFill>
+                <a:latin typeface="+mn-lt"/>
+                <a:ea typeface="+mn-ea"/>
+                <a:cs typeface="+mn-cs"/>
+              </a:defRPr>
+            </a:lvl4pPr>
+            <a:lvl5pPr marL="2057400" indent="-228600" algn="l" defTabSz="914400" rtl="0" eaLnBrk="1" latinLnBrk="0" hangingPunct="1">
+              <a:lnSpc>
+                <a:spcPct val="90000"/>
+              </a:lnSpc>
+              <a:spcBef>
+                <a:spcPts val="500"/>
+              </a:spcBef>
+              <a:buFont typeface="Arial" panose="020B0604020202020204" pitchFamily="34" charset="0"/>
+              <a:buChar char="•"/>
+              <a:defRPr sz="1800" kern="1200">
+                <a:solidFill>
+                  <a:schemeClr val="tx1"/>
+                </a:solidFill>
+                <a:latin typeface="+mn-lt"/>
+                <a:ea typeface="+mn-ea"/>
+                <a:cs typeface="+mn-cs"/>
+              </a:defRPr>
+            </a:lvl5pPr>
+            <a:lvl6pPr marL="2514600" indent="-228600" algn="l" defTabSz="914400" rtl="0" eaLnBrk="1" latinLnBrk="0" hangingPunct="1">
+              <a:lnSpc>
+                <a:spcPct val="90000"/>
+              </a:lnSpc>
+              <a:spcBef>
+                <a:spcPts val="500"/>
+              </a:spcBef>
+              <a:buFont typeface="Arial" panose="020B0604020202020204" pitchFamily="34" charset="0"/>
+              <a:buChar char="•"/>
+              <a:defRPr sz="1800" kern="1200">
+                <a:solidFill>
+                  <a:schemeClr val="tx1"/>
+                </a:solidFill>
+                <a:latin typeface="+mn-lt"/>
+                <a:ea typeface="+mn-ea"/>
+                <a:cs typeface="+mn-cs"/>
+              </a:defRPr>
+            </a:lvl6pPr>
+            <a:lvl7pPr marL="2971800" indent="-228600" algn="l" defTabSz="914400" rtl="0" eaLnBrk="1" latinLnBrk="0" hangingPunct="1">
+              <a:lnSpc>
+                <a:spcPct val="90000"/>
+              </a:lnSpc>
+              <a:spcBef>
+                <a:spcPts val="500"/>
+              </a:spcBef>
+              <a:buFont typeface="Arial" panose="020B0604020202020204" pitchFamily="34" charset="0"/>
+              <a:buChar char="•"/>
+              <a:defRPr sz="1800" kern="1200">
+                <a:solidFill>
+                  <a:schemeClr val="tx1"/>
+                </a:solidFill>
+                <a:latin typeface="+mn-lt"/>
+                <a:ea typeface="+mn-ea"/>
+                <a:cs typeface="+mn-cs"/>
+              </a:defRPr>
+            </a:lvl7pPr>
+            <a:lvl8pPr marL="3429000" indent="-228600" algn="l" defTabSz="914400" rtl="0" eaLnBrk="1" latinLnBrk="0" hangingPunct="1">
+              <a:lnSpc>
+                <a:spcPct val="90000"/>
+              </a:lnSpc>
+              <a:spcBef>
+                <a:spcPts val="500"/>
+              </a:spcBef>
+              <a:buFont typeface="Arial" panose="020B0604020202020204" pitchFamily="34" charset="0"/>
+              <a:buChar char="•"/>
+              <a:defRPr sz="1800" kern="1200">
+                <a:solidFill>
+                  <a:schemeClr val="tx1"/>
+                </a:solidFill>
+                <a:latin typeface="+mn-lt"/>
+                <a:ea typeface="+mn-ea"/>
+                <a:cs typeface="+mn-cs"/>
+              </a:defRPr>
+            </a:lvl8pPr>
+            <a:lvl9pPr marL="3886200" indent="-228600" algn="l" defTabSz="914400" rtl="0" eaLnBrk="1" latinLnBrk="0" hangingPunct="1">
+              <a:lnSpc>
+                <a:spcPct val="90000"/>
+              </a:lnSpc>
+              <a:spcBef>
+                <a:spcPts val="500"/>
+              </a:spcBef>
+              <a:buFont typeface="Arial" panose="020B0604020202020204" pitchFamily="34" charset="0"/>
+              <a:buChar char="•"/>
+              <a:defRPr sz="1800" kern="1200">
+                <a:solidFill>
+                  <a:schemeClr val="tx1"/>
+                </a:solidFill>
+                <a:latin typeface="+mn-lt"/>
+                <a:ea typeface="+mn-ea"/>
+                <a:cs typeface="+mn-cs"/>
+              </a:defRPr>
+            </a:lvl9pPr>
+          </a:lstStyle>
+          <a:p>
+            <a:pPr marL="0" indent="0">
+              <a:buFont typeface="Arial" panose="020B0604020202020204" pitchFamily="34" charset="0"/>
+              <a:buNone/>
+            </a:pPr>
+            <a:r>
+              <a:rPr lang="en-US" sz="2200" dirty="0"/>
+              <a:t>Reward (pass, fail, shirk) = 4, -4, 0.5;  effort (work) = -0.4; </a:t>
+            </a:r>
+            <a:r>
+              <a:rPr lang="en-US" sz="2200" dirty="0" err="1"/>
+              <a:t>N_runs</a:t>
+            </a:r>
+            <a:r>
+              <a:rPr lang="en-US" sz="2200" dirty="0"/>
+              <a:t>=5000</a:t>
+            </a:r>
+          </a:p>
+        </p:txBody>
+      </p:sp>
+    </p:spTree>
+    <p:extLst>
+      <p:ext uri="{BB962C8B-B14F-4D97-AF65-F5344CB8AC3E}">
+        <p14:creationId xmlns:p14="http://schemas.microsoft.com/office/powerpoint/2010/main" val="1632693472"/>
+      </p:ext>
+    </p:extLst>
+  </p:cSld>
+  <p:clrMapOvr>
+    <a:masterClrMapping/>
+  </p:clrMapOvr>
+</p:sld>
+</file>
+
 <file path=ppt/slides/slide2.xml><?xml version="1.0" encoding="utf-8"?>
 <p:sld xmlns:a="http://schemas.openxmlformats.org/drawingml/2006/main" xmlns:r="http://schemas.openxmlformats.org/officeDocument/2006/relationships" xmlns:p="http://schemas.openxmlformats.org/presentationml/2006/main">
   <p:cSld>

</xml_diff>